<commit_message>
:tada: Update Presentation and Report
</commit_message>
<xml_diff>
--- a/CISC3025-Project3-Presentation.pptx
+++ b/CISC3025-Project3-Presentation.pptx
@@ -11278,7 +11278,7 @@
                         <a:buNone/>
                       </a:pPr>
                       <a:r>
-                        <a:rPr lang="en-US" altLang="zh-CN" sz="900">
+                        <a:rPr lang="en-US" altLang="zh-CN" sz="900" dirty="0">
                           <a:solidFill>
                             <a:schemeClr val="dk1"/>
                           </a:solidFill>
@@ -11286,7 +11286,7 @@
                         <a:t>Social</a:t>
                       </a:r>
                       <a:r>
-                        <a:rPr lang="zh-CN" altLang="en-US" sz="900">
+                        <a:rPr lang="zh-CN" altLang="en-US" sz="900" dirty="0">
                           <a:solidFill>
                             <a:schemeClr val="dk1"/>
                           </a:solidFill>
@@ -11294,14 +11294,14 @@
                         <a:t> </a:t>
                       </a:r>
                       <a:r>
-                        <a:rPr lang="en-US" altLang="zh-CN" sz="900">
+                        <a:rPr lang="en-US" altLang="zh-CN" sz="900" dirty="0">
                           <a:solidFill>
                             <a:schemeClr val="dk1"/>
                           </a:solidFill>
                         </a:rPr>
                         <a:t>Status</a:t>
                       </a:r>
-                      <a:endParaRPr lang="en-CN" sz="900">
+                      <a:endParaRPr lang="en-CN" sz="900" dirty="0">
                         <a:solidFill>
                           <a:schemeClr val="dk1"/>
                         </a:solidFill>
@@ -12003,7 +12003,7 @@
                         <a:buNone/>
                       </a:pPr>
                       <a:r>
-                        <a:rPr lang="en-US" altLang="zh-CN" sz="900">
+                        <a:rPr lang="en-US" altLang="zh-CN" sz="900" dirty="0">
                           <a:solidFill>
                             <a:schemeClr val="dk1"/>
                           </a:solidFill>
@@ -12011,7 +12011,7 @@
                         <a:t>Is</a:t>
                       </a:r>
                       <a:r>
-                        <a:rPr lang="zh-CN" altLang="en-US" sz="900">
+                        <a:rPr lang="zh-CN" altLang="en-US" sz="900" dirty="0">
                           <a:solidFill>
                             <a:schemeClr val="dk1"/>
                           </a:solidFill>
@@ -12019,7 +12019,7 @@
                         <a:t> </a:t>
                       </a:r>
                       <a:r>
-                        <a:rPr lang="en-US" altLang="zh-CN" sz="900">
+                        <a:rPr lang="en-US" altLang="zh-CN" sz="900" dirty="0">
                           <a:solidFill>
                             <a:schemeClr val="dk1"/>
                           </a:solidFill>
@@ -12027,7 +12027,7 @@
                         <a:t>before</a:t>
                       </a:r>
                       <a:r>
-                        <a:rPr lang="zh-CN" altLang="en-US" sz="900">
+                        <a:rPr lang="zh-CN" altLang="en-US" sz="900" dirty="0">
                           <a:solidFill>
                             <a:schemeClr val="dk1"/>
                           </a:solidFill>
@@ -12035,7 +12035,7 @@
                         <a:t> </a:t>
                       </a:r>
                       <a:r>
-                        <a:rPr lang="en-US" altLang="zh-CN" sz="900">
+                        <a:rPr lang="en-US" altLang="zh-CN" sz="900" dirty="0">
                           <a:solidFill>
                             <a:schemeClr val="dk1"/>
                           </a:solidFill>
@@ -12043,7 +12043,7 @@
                         <a:t>the</a:t>
                       </a:r>
                       <a:r>
-                        <a:rPr lang="zh-CN" altLang="en-US" sz="900">
+                        <a:rPr lang="zh-CN" altLang="en-US" sz="900" dirty="0">
                           <a:solidFill>
                             <a:schemeClr val="dk1"/>
                           </a:solidFill>
@@ -12051,7 +12051,7 @@
                         <a:t> </a:t>
                       </a:r>
                       <a:r>
-                        <a:rPr lang="en-US" altLang="zh-CN" sz="900">
+                        <a:rPr lang="en-US" altLang="zh-CN" sz="900" dirty="0">
                           <a:solidFill>
                             <a:schemeClr val="dk1"/>
                           </a:solidFill>
@@ -12059,7 +12059,7 @@
                         <a:t>entity</a:t>
                       </a:r>
                       <a:r>
-                        <a:rPr lang="zh-CN" altLang="en-US" sz="900">
+                        <a:rPr lang="zh-CN" altLang="en-US" sz="900" dirty="0">
                           <a:solidFill>
                             <a:schemeClr val="dk1"/>
                           </a:solidFill>
@@ -12067,14 +12067,14 @@
                         <a:t> </a:t>
                       </a:r>
                       <a:r>
-                        <a:rPr lang="en-US" altLang="zh-CN" sz="900">
+                        <a:rPr lang="en-US" altLang="zh-CN" sz="900" dirty="0">
                           <a:solidFill>
                             <a:schemeClr val="dk1"/>
                           </a:solidFill>
                         </a:rPr>
                         <a:t>“’s”.</a:t>
                       </a:r>
-                      <a:endParaRPr lang="en-CN" sz="900">
+                      <a:endParaRPr lang="en-CN" sz="900" dirty="0">
                         <a:solidFill>
                           <a:schemeClr val="dk1"/>
                         </a:solidFill>
@@ -12384,7 +12384,7 @@
                         <a:buNone/>
                       </a:pPr>
                       <a:r>
-                        <a:rPr lang="en-US" altLang="zh-CN" sz="900">
+                        <a:rPr lang="en-US" altLang="zh-CN" sz="900" dirty="0">
                           <a:solidFill>
                             <a:schemeClr val="dk1"/>
                           </a:solidFill>
@@ -12392,7 +12392,7 @@
                         <a:t>Social</a:t>
                       </a:r>
                       <a:r>
-                        <a:rPr lang="zh-CN" altLang="en-US" sz="900">
+                        <a:rPr lang="zh-CN" altLang="en-US" sz="900" dirty="0">
                           <a:solidFill>
                             <a:schemeClr val="dk1"/>
                           </a:solidFill>
@@ -12400,14 +12400,14 @@
                         <a:t> </a:t>
                       </a:r>
                       <a:r>
-                        <a:rPr lang="en-US" altLang="zh-CN" sz="900">
+                        <a:rPr lang="en-US" altLang="zh-CN" sz="900" dirty="0">
                           <a:solidFill>
                             <a:schemeClr val="dk1"/>
                           </a:solidFill>
                         </a:rPr>
                         <a:t>Status</a:t>
                       </a:r>
-                      <a:endParaRPr lang="en-CN" sz="900">
+                      <a:endParaRPr lang="en-CN" sz="900" dirty="0">
                         <a:solidFill>
                           <a:schemeClr val="dk1"/>
                         </a:solidFill>
@@ -13013,7 +13013,7 @@
                         <a:buNone/>
                       </a:pPr>
                       <a:r>
-                        <a:rPr lang="en-US" altLang="zh-CN" sz="900">
+                        <a:rPr lang="en-US" altLang="zh-CN" sz="900" dirty="0">
                           <a:solidFill>
                             <a:schemeClr val="dk1"/>
                           </a:solidFill>
@@ -13021,7 +13021,7 @@
                         <a:t>A</a:t>
                       </a:r>
                       <a:r>
-                        <a:rPr lang="zh-CN" altLang="en-US" sz="900">
+                        <a:rPr lang="zh-CN" altLang="en-US" sz="900" dirty="0">
                           <a:solidFill>
                             <a:schemeClr val="dk1"/>
                           </a:solidFill>
@@ -13029,7 +13029,7 @@
                         <a:t> </a:t>
                       </a:r>
                       <a:r>
-                        <a:rPr lang="en-US" altLang="zh-CN" sz="900">
+                        <a:rPr lang="en-US" altLang="zh-CN" sz="900" dirty="0">
                           <a:solidFill>
                             <a:schemeClr val="dk1"/>
                           </a:solidFill>
@@ -13037,7 +13037,7 @@
                         <a:t>verb</a:t>
                       </a:r>
                       <a:r>
-                        <a:rPr lang="zh-CN" altLang="en-US" sz="900">
+                        <a:rPr lang="zh-CN" altLang="en-US" sz="900" dirty="0">
                           <a:solidFill>
                             <a:schemeClr val="dk1"/>
                           </a:solidFill>
@@ -13045,7 +13045,7 @@
                         <a:t> </a:t>
                       </a:r>
                       <a:r>
-                        <a:rPr lang="en-US" altLang="zh-CN" sz="900">
+                        <a:rPr lang="en-US" altLang="zh-CN" sz="900" dirty="0">
                           <a:solidFill>
                             <a:schemeClr val="dk1"/>
                           </a:solidFill>
@@ -13053,7 +13053,7 @@
                         <a:t>is</a:t>
                       </a:r>
                       <a:r>
-                        <a:rPr lang="zh-CN" altLang="en-US" sz="900">
+                        <a:rPr lang="zh-CN" altLang="en-US" sz="900" dirty="0">
                           <a:solidFill>
                             <a:schemeClr val="dk1"/>
                           </a:solidFill>
@@ -13061,7 +13061,7 @@
                         <a:t> </a:t>
                       </a:r>
                       <a:r>
-                        <a:rPr lang="en-US" altLang="zh-CN" sz="900">
+                        <a:rPr lang="en-US" altLang="zh-CN" sz="900" dirty="0">
                           <a:solidFill>
                             <a:schemeClr val="dk1"/>
                           </a:solidFill>
@@ -13069,7 +13069,7 @@
                         <a:t>after</a:t>
                       </a:r>
                       <a:r>
-                        <a:rPr lang="zh-CN" altLang="en-US" sz="900">
+                        <a:rPr lang="zh-CN" altLang="en-US" sz="900" dirty="0">
                           <a:solidFill>
                             <a:schemeClr val="dk1"/>
                           </a:solidFill>
@@ -13077,14 +13077,14 @@
                         <a:t> </a:t>
                       </a:r>
                       <a:r>
-                        <a:rPr lang="en-US" altLang="zh-CN" sz="900">
+                        <a:rPr lang="en-US" altLang="zh-CN" sz="900" dirty="0">
                           <a:solidFill>
                             <a:schemeClr val="dk1"/>
                           </a:solidFill>
                         </a:rPr>
                         <a:t>it.</a:t>
                       </a:r>
-                      <a:endParaRPr lang="en-CN" sz="900">
+                      <a:endParaRPr lang="en-CN" sz="900" dirty="0">
                         <a:solidFill>
                           <a:schemeClr val="dk1"/>
                         </a:solidFill>
@@ -18891,14 +18891,14 @@
                   <a:buNone/>
                 </a:pPr>
                 <a:r>
-                  <a:rPr lang="en-US" altLang="zh-CN" sz="1800" b="1">
+                  <a:rPr lang="en-US" altLang="zh-CN" sz="1800" b="1" dirty="0">
                     <a:solidFill>
                       <a:schemeClr val="dk1"/>
                     </a:solidFill>
                   </a:rPr>
                   <a:t>POS</a:t>
                 </a:r>
-                <a:endParaRPr/>
+                <a:endParaRPr dirty="0"/>
               </a:p>
             </p:txBody>
           </p:sp>
@@ -18964,7 +18964,7 @@
                   <a:buNone/>
                 </a:pPr>
                 <a:r>
-                  <a:rPr lang="en-US" altLang="zh-CN" sz="1800" b="1">
+                  <a:rPr lang="en-US" altLang="zh-CN" sz="1800" b="1" dirty="0">
                     <a:solidFill>
                       <a:schemeClr val="dk1"/>
                     </a:solidFill>
@@ -18983,7 +18983,7 @@
                   <a:buNone/>
                 </a:pPr>
                 <a:r>
-                  <a:rPr lang="en-US" altLang="zh-CN" sz="1300">
+                  <a:rPr lang="en-US" altLang="zh-CN" sz="1300" dirty="0">
                     <a:solidFill>
                       <a:schemeClr val="dk1"/>
                     </a:solidFill>
@@ -18991,7 +18991,7 @@
                   <a:t>Pre-process</a:t>
                 </a:r>
                 <a:r>
-                  <a:rPr lang="zh-CN" altLang="en-US" sz="1300">
+                  <a:rPr lang="zh-CN" altLang="en-US" sz="1300" dirty="0">
                     <a:solidFill>
                       <a:schemeClr val="dk1"/>
                     </a:solidFill>
@@ -18999,7 +18999,7 @@
                   <a:t> </a:t>
                 </a:r>
                 <a:r>
-                  <a:rPr lang="en-US" altLang="zh-CN" sz="1300">
+                  <a:rPr lang="en-US" altLang="zh-CN" sz="1300" dirty="0">
                     <a:solidFill>
                       <a:schemeClr val="dk1"/>
                     </a:solidFill>
@@ -19007,7 +19007,7 @@
                   <a:t>training</a:t>
                 </a:r>
                 <a:r>
-                  <a:rPr lang="zh-CN" altLang="en-US" sz="1300">
+                  <a:rPr lang="zh-CN" altLang="en-US" sz="1300" dirty="0">
                     <a:solidFill>
                       <a:schemeClr val="dk1"/>
                     </a:solidFill>
@@ -19015,7 +19015,7 @@
                   <a:t> </a:t>
                 </a:r>
                 <a:r>
-                  <a:rPr lang="en-US" altLang="zh-CN" sz="1300">
+                  <a:rPr lang="en-US" altLang="zh-CN" sz="1300" dirty="0">
                     <a:solidFill>
                       <a:schemeClr val="dk1"/>
                     </a:solidFill>
@@ -19023,7 +19023,7 @@
                   <a:t>data</a:t>
                 </a:r>
                 <a:r>
-                  <a:rPr lang="zh-CN" altLang="en-US" sz="1300">
+                  <a:rPr lang="zh-CN" altLang="en-US" sz="1300" dirty="0">
                     <a:solidFill>
                       <a:schemeClr val="dk1"/>
                     </a:solidFill>
@@ -19031,7 +19031,7 @@
                   <a:t> </a:t>
                 </a:r>
                 <a:r>
-                  <a:rPr lang="en-US" altLang="zh-CN" sz="1300">
+                  <a:rPr lang="en-US" altLang="zh-CN" sz="1300" dirty="0">
                     <a:solidFill>
                       <a:schemeClr val="dk1"/>
                     </a:solidFill>
@@ -19039,7 +19039,7 @@
                   <a:t>to</a:t>
                 </a:r>
                 <a:r>
-                  <a:rPr lang="zh-CN" altLang="en-US" sz="1300">
+                  <a:rPr lang="zh-CN" altLang="en-US" sz="1300" dirty="0">
                     <a:solidFill>
                       <a:schemeClr val="dk1"/>
                     </a:solidFill>
@@ -19047,7 +19047,7 @@
                   <a:t> </a:t>
                 </a:r>
                 <a:r>
-                  <a:rPr lang="en-US" altLang="zh-CN" sz="1300">
+                  <a:rPr lang="en-US" altLang="zh-CN" sz="1300" dirty="0">
                     <a:solidFill>
                       <a:schemeClr val="dk1"/>
                     </a:solidFill>
@@ -19055,7 +19055,7 @@
                   <a:t>eliminate</a:t>
                 </a:r>
                 <a:r>
-                  <a:rPr lang="zh-CN" altLang="en-US" sz="1300">
+                  <a:rPr lang="zh-CN" altLang="en-US" sz="1300" dirty="0">
                     <a:solidFill>
                       <a:schemeClr val="dk1"/>
                     </a:solidFill>
@@ -19063,7 +19063,7 @@
                   <a:t> </a:t>
                 </a:r>
                 <a:r>
-                  <a:rPr lang="en-US" altLang="zh-CN" sz="1300">
+                  <a:rPr lang="en-US" altLang="zh-CN" sz="1300" dirty="0">
                     <a:solidFill>
                       <a:schemeClr val="dk1"/>
                     </a:solidFill>
@@ -19071,7 +19071,7 @@
                   <a:t>noise,</a:t>
                 </a:r>
                 <a:r>
-                  <a:rPr lang="zh-CN" altLang="en-US" sz="1300">
+                  <a:rPr lang="zh-CN" altLang="en-US" sz="1300" dirty="0">
                     <a:solidFill>
                       <a:schemeClr val="dk1"/>
                     </a:solidFill>
@@ -19079,7 +19079,7 @@
                   <a:t> </a:t>
                 </a:r>
                 <a:r>
-                  <a:rPr lang="en-US" altLang="zh-CN" sz="1300">
+                  <a:rPr lang="en-US" altLang="zh-CN" sz="1300" dirty="0">
                     <a:solidFill>
                       <a:schemeClr val="dk1"/>
                     </a:solidFill>
@@ -19087,7 +19087,7 @@
                   <a:t>using</a:t>
                 </a:r>
                 <a:r>
-                  <a:rPr lang="zh-CN" altLang="en-US" sz="1300">
+                  <a:rPr lang="zh-CN" altLang="en-US" sz="1300" dirty="0">
                     <a:solidFill>
                       <a:schemeClr val="dk1"/>
                     </a:solidFill>
@@ -19095,7 +19095,7 @@
                   <a:t> </a:t>
                 </a:r>
                 <a:r>
-                  <a:rPr lang="en-US" altLang="zh-CN" sz="1300">
+                  <a:rPr lang="en-US" altLang="zh-CN" sz="1300" dirty="0">
                     <a:solidFill>
                       <a:schemeClr val="dk1"/>
                     </a:solidFill>
@@ -19103,7 +19103,7 @@
                   <a:t>Support</a:t>
                 </a:r>
                 <a:r>
-                  <a:rPr lang="zh-CN" altLang="en-US" sz="1300">
+                  <a:rPr lang="zh-CN" altLang="en-US" sz="1300" dirty="0">
                     <a:solidFill>
                       <a:schemeClr val="dk1"/>
                     </a:solidFill>
@@ -19111,7 +19111,7 @@
                   <a:t> </a:t>
                 </a:r>
                 <a:r>
-                  <a:rPr lang="en-US" altLang="zh-CN" sz="1300">
+                  <a:rPr lang="en-US" altLang="zh-CN" sz="1300" dirty="0">
                     <a:solidFill>
                       <a:schemeClr val="dk1"/>
                     </a:solidFill>
@@ -19119,7 +19119,7 @@
                   <a:t>Vector</a:t>
                 </a:r>
                 <a:r>
-                  <a:rPr lang="zh-CN" altLang="en-US" sz="1300">
+                  <a:rPr lang="zh-CN" altLang="en-US" sz="1300" dirty="0">
                     <a:solidFill>
                       <a:schemeClr val="dk1"/>
                     </a:solidFill>
@@ -19127,14 +19127,14 @@
                   <a:t> </a:t>
                 </a:r>
                 <a:r>
-                  <a:rPr lang="en-US" altLang="zh-CN" sz="1300">
+                  <a:rPr lang="en-US" altLang="zh-CN" sz="1300" dirty="0">
                     <a:solidFill>
                       <a:schemeClr val="dk1"/>
                     </a:solidFill>
                   </a:rPr>
                   <a:t>Machine.</a:t>
                 </a:r>
-                <a:endParaRPr sz="1300">
+                <a:endParaRPr sz="1300" dirty="0">
                   <a:solidFill>
                     <a:schemeClr val="dk1"/>
                   </a:solidFill>
@@ -22186,14 +22186,14 @@
                         <a:buNone/>
                       </a:pPr>
                       <a:r>
-                        <a:rPr lang="zh-CN" sz="900">
+                        <a:rPr lang="zh-CN" sz="900" dirty="0">
                           <a:solidFill>
                             <a:schemeClr val="dk1"/>
                           </a:solidFill>
                         </a:rPr>
                         <a:t>Assumes that some specific pattern could distinguish names</a:t>
                       </a:r>
-                      <a:endParaRPr sz="900">
+                      <a:endParaRPr sz="900" dirty="0">
                         <a:solidFill>
                           <a:schemeClr val="dk1"/>
                         </a:solidFill>
@@ -22738,14 +22738,14 @@
                         <a:buNone/>
                       </a:pPr>
                       <a:r>
-                        <a:rPr lang="zh-CN" sz="900">
+                        <a:rPr lang="zh-CN" sz="900" dirty="0">
                           <a:solidFill>
                             <a:schemeClr val="dk1"/>
                           </a:solidFill>
                         </a:rPr>
                         <a:t>Jonathan, Jason</a:t>
                       </a:r>
-                      <a:endParaRPr sz="900">
+                      <a:endParaRPr sz="900" dirty="0">
                         <a:solidFill>
                           <a:schemeClr val="dk1"/>
                         </a:solidFill>
@@ -22761,7 +22761,7 @@
                         </a:spcAft>
                         <a:buNone/>
                       </a:pPr>
-                      <a:endParaRPr sz="900">
+                      <a:endParaRPr sz="900" dirty="0">
                         <a:solidFill>
                           <a:schemeClr val="dk1"/>
                         </a:solidFill>
@@ -22778,14 +22778,14 @@
                         <a:buNone/>
                       </a:pPr>
                       <a:r>
-                        <a:rPr lang="zh-CN" sz="900">
+                        <a:rPr lang="zh-CN" sz="900" dirty="0">
                           <a:solidFill>
                             <a:schemeClr val="dk1"/>
                           </a:solidFill>
                         </a:rPr>
                         <a:t>MacArthur, McDonald</a:t>
                       </a:r>
-                      <a:endParaRPr sz="900">
+                      <a:endParaRPr sz="900" dirty="0">
                         <a:solidFill>
                           <a:schemeClr val="dk1"/>
                         </a:solidFill>
@@ -22801,7 +22801,7 @@
                         </a:spcAft>
                         <a:buNone/>
                       </a:pPr>
-                      <a:endParaRPr sz="900">
+                      <a:endParaRPr sz="900" dirty="0">
                         <a:solidFill>
                           <a:schemeClr val="dk1"/>
                         </a:solidFill>
@@ -22818,14 +22818,14 @@
                         <a:buNone/>
                       </a:pPr>
                       <a:r>
-                        <a:rPr lang="zh-CN" sz="900">
+                        <a:rPr lang="zh-CN" sz="900" dirty="0">
                           <a:solidFill>
                             <a:schemeClr val="dk1"/>
                           </a:solidFill>
                         </a:rPr>
                         <a:t>O’Brien</a:t>
                       </a:r>
-                      <a:endParaRPr sz="900">
+                      <a:endParaRPr sz="900" dirty="0">
                         <a:solidFill>
                           <a:schemeClr val="dk1"/>
                         </a:solidFill>
@@ -23331,14 +23331,14 @@
                         <a:buNone/>
                       </a:pPr>
                       <a:r>
-                        <a:rPr lang="zh-CN" sz="900">
+                        <a:rPr lang="zh-CN" sz="900" dirty="0">
                           <a:solidFill>
                             <a:schemeClr val="dk1"/>
                           </a:solidFill>
                         </a:rPr>
                         <a:t>movement, </a:t>
                       </a:r>
-                      <a:endParaRPr sz="900">
+                      <a:endParaRPr sz="900" dirty="0">
                         <a:solidFill>
                           <a:schemeClr val="dk1"/>
                         </a:solidFill>
@@ -23355,14 +23355,14 @@
                         <a:buNone/>
                       </a:pPr>
                       <a:r>
-                        <a:rPr lang="zh-CN" sz="900">
+                        <a:rPr lang="zh-CN" sz="900" dirty="0">
                           <a:solidFill>
                             <a:schemeClr val="dk1"/>
                           </a:solidFill>
                         </a:rPr>
                         <a:t>action, </a:t>
                       </a:r>
-                      <a:endParaRPr sz="900">
+                      <a:endParaRPr sz="900" dirty="0">
                         <a:solidFill>
                           <a:schemeClr val="dk1"/>
                         </a:solidFill>
@@ -23379,14 +23379,14 @@
                         <a:buNone/>
                       </a:pPr>
                       <a:r>
-                        <a:rPr lang="zh-CN" sz="900">
+                        <a:rPr lang="zh-CN" sz="900" dirty="0">
                           <a:solidFill>
                             <a:schemeClr val="dk1"/>
                           </a:solidFill>
                         </a:rPr>
                         <a:t>correctness, membership,</a:t>
                       </a:r>
-                      <a:endParaRPr sz="900">
+                      <a:endParaRPr sz="900" dirty="0">
                         <a:solidFill>
                           <a:schemeClr val="dk1"/>
                         </a:solidFill>
@@ -23403,14 +23403,14 @@
                         <a:buNone/>
                       </a:pPr>
                       <a:r>
-                        <a:rPr lang="zh-CN" sz="900">
+                        <a:rPr lang="zh-CN" sz="900" dirty="0">
                           <a:solidFill>
                             <a:schemeClr val="dk1"/>
                           </a:solidFill>
                         </a:rPr>
                         <a:t>likelihood, </a:t>
                       </a:r>
-                      <a:endParaRPr sz="900">
+                      <a:endParaRPr sz="900" dirty="0">
                         <a:solidFill>
                           <a:schemeClr val="dk1"/>
                         </a:solidFill>
@@ -23427,14 +23427,14 @@
                         <a:buNone/>
                       </a:pPr>
                       <a:r>
-                        <a:rPr lang="zh-CN" sz="900">
+                        <a:rPr lang="zh-CN" sz="900" dirty="0">
                           <a:solidFill>
                             <a:schemeClr val="dk1"/>
                           </a:solidFill>
                         </a:rPr>
                         <a:t>usage, </a:t>
                       </a:r>
-                      <a:endParaRPr sz="900">
+                      <a:endParaRPr sz="900" dirty="0">
                         <a:solidFill>
                           <a:schemeClr val="dk1"/>
                         </a:solidFill>
@@ -23451,14 +23451,14 @@
                         <a:buNone/>
                       </a:pPr>
                       <a:r>
-                        <a:rPr lang="zh-CN" sz="900">
+                        <a:rPr lang="zh-CN" sz="900" dirty="0">
                           <a:solidFill>
                             <a:schemeClr val="dk1"/>
                           </a:solidFill>
                         </a:rPr>
                         <a:t>allowance</a:t>
                       </a:r>
-                      <a:endParaRPr sz="900">
+                      <a:endParaRPr sz="900" dirty="0">
                         <a:solidFill>
                           <a:schemeClr val="dk1"/>
                         </a:solidFill>

</xml_diff>

<commit_message>
:pencil: Change Presentation File
</commit_message>
<xml_diff>
--- a/CISC3025-Project3-Presentation.pptx
+++ b/CISC3025-Project3-Presentation.pptx
@@ -5,7 +5,7 @@
     <p:sldMasterId id="2147483659" r:id="rId1"/>
   </p:sldMasterIdLst>
   <p:notesMasterIdLst>
-    <p:notesMasterId r:id="rId26"/>
+    <p:notesMasterId r:id="rId25"/>
   </p:notesMasterIdLst>
   <p:sldIdLst>
     <p:sldId id="256" r:id="rId2"/>
@@ -29,9 +29,8 @@
     <p:sldId id="277" r:id="rId20"/>
     <p:sldId id="278" r:id="rId21"/>
     <p:sldId id="280" r:id="rId22"/>
-    <p:sldId id="275" r:id="rId23"/>
-    <p:sldId id="273" r:id="rId24"/>
-    <p:sldId id="274" r:id="rId25"/>
+    <p:sldId id="273" r:id="rId23"/>
+    <p:sldId id="274" r:id="rId24"/>
   </p:sldIdLst>
   <p:sldSz cx="9144000" cy="5143500" type="screen16x9"/>
   <p:notesSz cx="6858000" cy="9144000"/>
@@ -8401,7 +8400,7 @@
         <p14:prism/>
       </p:transition>
     </mc:Choice>
-    <mc:Fallback xmlns:ahyp="http://schemas.microsoft.com/office/drawing/2018/hyperlinkcolor" xmlns:p15="http://schemas.microsoft.com/office/powerpoint/2012/main" xmlns:com="http://schemas.openxmlformats.org/drawingml/2006/compatibility" xmlns:pvml="urn:schemas-microsoft-com:office:powerpoint" xmlns:v="urn:schemas-microsoft-com:vml" xmlns:o="urn:schemas-microsoft-com:office:office" xmlns:dgm="http://schemas.openxmlformats.org/drawingml/2006/diagram" xmlns:c="http://schemas.openxmlformats.org/drawingml/2006/chart" xmlns:mv="urn:schemas-microsoft-com:mac:vml" xmlns="">
+    <mc:Fallback xmlns="" xmlns:mv="urn:schemas-microsoft-com:mac:vml" xmlns:c="http://schemas.openxmlformats.org/drawingml/2006/chart" xmlns:dgm="http://schemas.openxmlformats.org/drawingml/2006/diagram" xmlns:o="urn:schemas-microsoft-com:office:office" xmlns:v="urn:schemas-microsoft-com:vml" xmlns:pvml="urn:schemas-microsoft-com:office:powerpoint" xmlns:com="http://schemas.openxmlformats.org/drawingml/2006/compatibility" xmlns:p15="http://schemas.microsoft.com/office/powerpoint/2012/main" xmlns:ahyp="http://schemas.microsoft.com/office/drawing/2018/hyperlinkcolor">
       <p:transition spd="med">
         <p:fade/>
       </p:transition>
@@ -10399,7 +10398,7 @@
         <p14:prism/>
       </p:transition>
     </mc:Choice>
-    <mc:Fallback xmlns:ahyp="http://schemas.microsoft.com/office/drawing/2018/hyperlinkcolor" xmlns:p15="http://schemas.microsoft.com/office/powerpoint/2012/main" xmlns:com="http://schemas.openxmlformats.org/drawingml/2006/compatibility" xmlns:pvml="urn:schemas-microsoft-com:office:powerpoint" xmlns:v="urn:schemas-microsoft-com:vml" xmlns:o="urn:schemas-microsoft-com:office:office" xmlns:dgm="http://schemas.openxmlformats.org/drawingml/2006/diagram" xmlns:c="http://schemas.openxmlformats.org/drawingml/2006/chart" xmlns:mv="urn:schemas-microsoft-com:mac:vml" xmlns="">
+    <mc:Fallback xmlns="" xmlns:mv="urn:schemas-microsoft-com:mac:vml" xmlns:c="http://schemas.openxmlformats.org/drawingml/2006/chart" xmlns:dgm="http://schemas.openxmlformats.org/drawingml/2006/diagram" xmlns:o="urn:schemas-microsoft-com:office:office" xmlns:v="urn:schemas-microsoft-com:vml" xmlns:pvml="urn:schemas-microsoft-com:office:powerpoint" xmlns:com="http://schemas.openxmlformats.org/drawingml/2006/compatibility" xmlns:p15="http://schemas.microsoft.com/office/powerpoint/2012/main" xmlns:ahyp="http://schemas.microsoft.com/office/drawing/2018/hyperlinkcolor">
       <p:transition spd="med">
         <p:fade/>
       </p:transition>
@@ -18483,785 +18482,6 @@
   <p:cSld>
     <p:spTree>
       <p:nvGrpSpPr>
-        <p:cNvPr id="1" name=""/>
-        <p:cNvGrpSpPr/>
-        <p:nvPr/>
-      </p:nvGrpSpPr>
-      <p:grpSpPr>
-        <a:xfrm>
-          <a:off x="0" y="0"/>
-          <a:ext cx="0" cy="0"/>
-          <a:chOff x="0" y="0"/>
-          <a:chExt cx="0" cy="0"/>
-        </a:xfrm>
-      </p:grpSpPr>
-      <p:sp>
-        <p:nvSpPr>
-          <p:cNvPr id="2" name="Title 1">
-            <a:extLst>
-              <a:ext uri="{FF2B5EF4-FFF2-40B4-BE49-F238E27FC236}">
-                <a16:creationId xmlns:a16="http://schemas.microsoft.com/office/drawing/2014/main" id="{1800E544-D98C-5694-2075-4925813314B0}"/>
-              </a:ext>
-            </a:extLst>
-          </p:cNvPr>
-          <p:cNvSpPr>
-            <a:spLocks noGrp="1"/>
-          </p:cNvSpPr>
-          <p:nvPr>
-            <p:ph type="title"/>
-          </p:nvPr>
-        </p:nvSpPr>
-        <p:spPr/>
-        <p:txBody>
-          <a:bodyPr>
-            <a:normAutofit fontScale="90000"/>
-          </a:bodyPr>
-          <a:lstStyle/>
-          <a:p>
-            <a:r>
-              <a:rPr lang="zh-CN"/>
-              <a:t>/ Evaluations and Demo / </a:t>
-            </a:r>
-            <a:r>
-              <a:rPr lang="en-US" altLang="zh-CN"/>
-              <a:t>Future</a:t>
-            </a:r>
-            <a:r>
-              <a:rPr lang="zh-CN" altLang="en-US"/>
-              <a:t> </a:t>
-            </a:r>
-            <a:r>
-              <a:rPr lang="en-US" altLang="zh-CN"/>
-              <a:t>Improvements</a:t>
-            </a:r>
-            <a:endParaRPr lang="en-CN"/>
-          </a:p>
-        </p:txBody>
-      </p:sp>
-      <p:grpSp>
-        <p:nvGrpSpPr>
-          <p:cNvPr id="11" name="Group 10">
-            <a:extLst>
-              <a:ext uri="{FF2B5EF4-FFF2-40B4-BE49-F238E27FC236}">
-                <a16:creationId xmlns:a16="http://schemas.microsoft.com/office/drawing/2014/main" id="{B3FD4376-2D7D-22E1-8F47-FD0CE6477FA1}"/>
-              </a:ext>
-            </a:extLst>
-          </p:cNvPr>
-          <p:cNvGrpSpPr/>
-          <p:nvPr/>
-        </p:nvGrpSpPr>
-        <p:grpSpPr>
-          <a:xfrm>
-            <a:off x="2108112" y="1560260"/>
-            <a:ext cx="4927775" cy="2554842"/>
-            <a:chOff x="2199480" y="1550100"/>
-            <a:chExt cx="4927775" cy="2554842"/>
-          </a:xfrm>
-        </p:grpSpPr>
-        <p:grpSp>
-          <p:nvGrpSpPr>
-            <p:cNvPr id="8" name="Group 7">
-              <a:extLst>
-                <a:ext uri="{FF2B5EF4-FFF2-40B4-BE49-F238E27FC236}">
-                  <a16:creationId xmlns:a16="http://schemas.microsoft.com/office/drawing/2014/main" id="{DB73112C-3EE8-261C-E9CB-733EDA781B29}"/>
-                </a:ext>
-              </a:extLst>
-            </p:cNvPr>
-            <p:cNvGrpSpPr/>
-            <p:nvPr/>
-          </p:nvGrpSpPr>
-          <p:grpSpPr>
-            <a:xfrm>
-              <a:off x="2199480" y="1550100"/>
-              <a:ext cx="2098200" cy="2554842"/>
-              <a:chOff x="693325" y="1550100"/>
-              <a:chExt cx="2098200" cy="2554842"/>
-            </a:xfrm>
-          </p:grpSpPr>
-          <p:sp>
-            <p:nvSpPr>
-              <p:cNvPr id="3" name="Google Shape;114;p18">
-                <a:extLst>
-                  <a:ext uri="{FF2B5EF4-FFF2-40B4-BE49-F238E27FC236}">
-                    <a16:creationId xmlns:a16="http://schemas.microsoft.com/office/drawing/2014/main" id="{BAD91CAD-5D7E-4F7B-A0D6-830C75182910}"/>
-                  </a:ext>
-                </a:extLst>
-              </p:cNvPr>
-              <p:cNvSpPr txBox="1"/>
-              <p:nvPr/>
-            </p:nvSpPr>
-            <p:spPr>
-              <a:xfrm>
-                <a:off x="693325" y="2843088"/>
-                <a:ext cx="2098200" cy="1261854"/>
-              </a:xfrm>
-              <a:prstGeom prst="rect">
-                <a:avLst/>
-              </a:prstGeom>
-              <a:noFill/>
-              <a:ln>
-                <a:noFill/>
-              </a:ln>
-            </p:spPr>
-            <p:txBody>
-              <a:bodyPr spcFirstLastPara="1" wrap="square" lIns="91425" tIns="91425" rIns="91425" bIns="91425" anchor="t" anchorCtr="0">
-                <a:spAutoFit/>
-              </a:bodyPr>
-              <a:lstStyle/>
-              <a:p>
-                <a:pPr marL="0" lvl="0" indent="0" algn="ctr" rtl="0">
-                  <a:spcBef>
-                    <a:spcPts val="0"/>
-                  </a:spcBef>
-                  <a:spcAft>
-                    <a:spcPts val="0"/>
-                  </a:spcAft>
-                  <a:buNone/>
-                </a:pPr>
-                <a:r>
-                  <a:rPr lang="en-US" altLang="zh-CN" sz="1800" b="1">
-                    <a:solidFill>
-                      <a:schemeClr val="dk1"/>
-                    </a:solidFill>
-                  </a:rPr>
-                  <a:t>POS</a:t>
-                </a:r>
-                <a:r>
-                  <a:rPr lang="zh-CN" altLang="en-US" sz="1800" b="1">
-                    <a:solidFill>
-                      <a:schemeClr val="dk1"/>
-                    </a:solidFill>
-                  </a:rPr>
-                  <a:t> </a:t>
-                </a:r>
-                <a:r>
-                  <a:rPr lang="en-US" altLang="zh-CN" sz="1800" b="1">
-                    <a:solidFill>
-                      <a:schemeClr val="dk1"/>
-                    </a:solidFill>
-                  </a:rPr>
-                  <a:t>Features</a:t>
-                </a:r>
-              </a:p>
-              <a:p>
-                <a:pPr marL="0" lvl="0" indent="0" rtl="0">
-                  <a:spcBef>
-                    <a:spcPts val="0"/>
-                  </a:spcBef>
-                  <a:spcAft>
-                    <a:spcPts val="0"/>
-                  </a:spcAft>
-                  <a:buNone/>
-                </a:pPr>
-                <a:r>
-                  <a:rPr lang="en-US" altLang="zh-CN" sz="1300">
-                    <a:solidFill>
-                      <a:schemeClr val="dk1"/>
-                    </a:solidFill>
-                  </a:rPr>
-                  <a:t>Part</a:t>
-                </a:r>
-                <a:r>
-                  <a:rPr lang="zh-CN" altLang="en-US" sz="1300">
-                    <a:solidFill>
-                      <a:schemeClr val="dk1"/>
-                    </a:solidFill>
-                  </a:rPr>
-                  <a:t> </a:t>
-                </a:r>
-                <a:r>
-                  <a:rPr lang="en-US" altLang="zh-CN" sz="1300">
-                    <a:solidFill>
-                      <a:schemeClr val="dk1"/>
-                    </a:solidFill>
-                  </a:rPr>
-                  <a:t>of</a:t>
-                </a:r>
-                <a:r>
-                  <a:rPr lang="zh-CN" altLang="en-US" sz="1300">
-                    <a:solidFill>
-                      <a:schemeClr val="dk1"/>
-                    </a:solidFill>
-                  </a:rPr>
-                  <a:t> </a:t>
-                </a:r>
-                <a:r>
-                  <a:rPr lang="en-US" altLang="zh-CN" sz="1300">
-                    <a:solidFill>
-                      <a:schemeClr val="dk1"/>
-                    </a:solidFill>
-                  </a:rPr>
-                  <a:t>Speech</a:t>
-                </a:r>
-                <a:r>
-                  <a:rPr lang="zh-CN" altLang="en-US" sz="1300">
-                    <a:solidFill>
-                      <a:schemeClr val="dk1"/>
-                    </a:solidFill>
-                  </a:rPr>
-                  <a:t> </a:t>
-                </a:r>
-                <a:r>
-                  <a:rPr lang="en-US" altLang="zh-CN" sz="1300">
-                    <a:solidFill>
-                      <a:schemeClr val="dk1"/>
-                    </a:solidFill>
-                  </a:rPr>
-                  <a:t>Features</a:t>
-                </a:r>
-                <a:r>
-                  <a:rPr lang="zh-CN" altLang="en-US" sz="1300">
-                    <a:solidFill>
-                      <a:schemeClr val="dk1"/>
-                    </a:solidFill>
-                  </a:rPr>
-                  <a:t> </a:t>
-                </a:r>
-                <a:r>
-                  <a:rPr lang="en-US" altLang="zh-CN" sz="1300">
-                    <a:solidFill>
-                      <a:schemeClr val="dk1"/>
-                    </a:solidFill>
-                  </a:rPr>
-                  <a:t>are</a:t>
-                </a:r>
-                <a:r>
-                  <a:rPr lang="zh-CN" altLang="en-US" sz="1300">
-                    <a:solidFill>
-                      <a:schemeClr val="dk1"/>
-                    </a:solidFill>
-                  </a:rPr>
-                  <a:t> </a:t>
-                </a:r>
-                <a:r>
-                  <a:rPr lang="en-US" altLang="zh-CN" sz="1300">
-                    <a:solidFill>
-                      <a:schemeClr val="dk1"/>
-                    </a:solidFill>
-                  </a:rPr>
-                  <a:t>quite</a:t>
-                </a:r>
-                <a:r>
-                  <a:rPr lang="zh-CN" altLang="en-US" sz="1300">
-                    <a:solidFill>
-                      <a:schemeClr val="dk1"/>
-                    </a:solidFill>
-                  </a:rPr>
-                  <a:t> </a:t>
-                </a:r>
-                <a:r>
-                  <a:rPr lang="en-US" altLang="zh-CN" sz="1300">
-                    <a:solidFill>
-                      <a:schemeClr val="dk1"/>
-                    </a:solidFill>
-                  </a:rPr>
-                  <a:t>effective</a:t>
-                </a:r>
-                <a:r>
-                  <a:rPr lang="zh-CN" altLang="en-US" sz="1300">
-                    <a:solidFill>
-                      <a:schemeClr val="dk1"/>
-                    </a:solidFill>
-                  </a:rPr>
-                  <a:t> </a:t>
-                </a:r>
-                <a:r>
-                  <a:rPr lang="en-US" altLang="zh-CN" sz="1300">
-                    <a:solidFill>
-                      <a:schemeClr val="dk1"/>
-                    </a:solidFill>
-                  </a:rPr>
-                  <a:t>for</a:t>
-                </a:r>
-                <a:r>
-                  <a:rPr lang="zh-CN" altLang="en-US" sz="1300">
-                    <a:solidFill>
-                      <a:schemeClr val="dk1"/>
-                    </a:solidFill>
-                  </a:rPr>
-                  <a:t> </a:t>
-                </a:r>
-                <a:r>
-                  <a:rPr lang="en-US" altLang="zh-CN" sz="1300">
-                    <a:solidFill>
-                      <a:schemeClr val="dk1"/>
-                    </a:solidFill>
-                  </a:rPr>
-                  <a:t>discriminating</a:t>
-                </a:r>
-                <a:r>
-                  <a:rPr lang="zh-CN" altLang="en-US" sz="1300">
-                    <a:solidFill>
-                      <a:schemeClr val="dk1"/>
-                    </a:solidFill>
-                  </a:rPr>
-                  <a:t> </a:t>
-                </a:r>
-                <a:r>
-                  <a:rPr lang="en-US" altLang="zh-CN" sz="1300">
-                    <a:solidFill>
-                      <a:schemeClr val="dk1"/>
-                    </a:solidFill>
-                  </a:rPr>
-                  <a:t>entity</a:t>
-                </a:r>
-                <a:r>
-                  <a:rPr lang="zh-CN" altLang="en-US" sz="1300">
-                    <a:solidFill>
-                      <a:schemeClr val="dk1"/>
-                    </a:solidFill>
-                  </a:rPr>
-                  <a:t> </a:t>
-                </a:r>
-                <a:r>
-                  <a:rPr lang="en-US" altLang="zh-CN" sz="1300">
-                    <a:solidFill>
-                      <a:schemeClr val="dk1"/>
-                    </a:solidFill>
-                  </a:rPr>
-                  <a:t>classes</a:t>
-                </a:r>
-                <a:r>
-                  <a:rPr lang="zh-CN" altLang="en-US" sz="1300">
-                    <a:solidFill>
-                      <a:schemeClr val="dk1"/>
-                    </a:solidFill>
-                  </a:rPr>
-                  <a:t> </a:t>
-                </a:r>
-                <a:r>
-                  <a:rPr lang="en-US" altLang="zh-CN" sz="1300">
-                    <a:solidFill>
-                      <a:schemeClr val="dk1"/>
-                    </a:solidFill>
-                  </a:rPr>
-                  <a:t>.</a:t>
-                </a:r>
-                <a:endParaRPr sz="1300">
-                  <a:solidFill>
-                    <a:schemeClr val="dk1"/>
-                  </a:solidFill>
-                </a:endParaRPr>
-              </a:p>
-            </p:txBody>
-          </p:sp>
-          <p:sp>
-            <p:nvSpPr>
-              <p:cNvPr id="4" name="Google Shape;117;p18">
-                <a:extLst>
-                  <a:ext uri="{FF2B5EF4-FFF2-40B4-BE49-F238E27FC236}">
-                    <a16:creationId xmlns:a16="http://schemas.microsoft.com/office/drawing/2014/main" id="{BFCA5301-7380-91CA-68B2-374C0B515498}"/>
-                  </a:ext>
-                </a:extLst>
-              </p:cNvPr>
-              <p:cNvSpPr/>
-              <p:nvPr/>
-            </p:nvSpPr>
-            <p:spPr>
-              <a:xfrm>
-                <a:off x="693325" y="1550100"/>
-                <a:ext cx="2098200" cy="1234200"/>
-              </a:xfrm>
-              <a:prstGeom prst="wedgeEllipseCallout">
-                <a:avLst>
-                  <a:gd name="adj1" fmla="val -38494"/>
-                  <a:gd name="adj2" fmla="val 53352"/>
-                </a:avLst>
-              </a:prstGeom>
-              <a:solidFill>
-                <a:srgbClr val="434343"/>
-              </a:solidFill>
-              <a:ln>
-                <a:noFill/>
-              </a:ln>
-            </p:spPr>
-            <p:txBody>
-              <a:bodyPr spcFirstLastPara="1" wrap="square" lIns="91425" tIns="91425" rIns="91425" bIns="91425" anchor="ctr" anchorCtr="0">
-                <a:noAutofit/>
-              </a:bodyPr>
-              <a:lstStyle/>
-              <a:p>
-                <a:pPr marL="0" lvl="0" indent="0" algn="ctr" rtl="0">
-                  <a:spcBef>
-                    <a:spcPts val="0"/>
-                  </a:spcBef>
-                  <a:spcAft>
-                    <a:spcPts val="0"/>
-                  </a:spcAft>
-                  <a:buNone/>
-                </a:pPr>
-                <a:r>
-                  <a:rPr lang="en-US" altLang="zh-CN" sz="1800" b="1" dirty="0">
-                    <a:solidFill>
-                      <a:schemeClr val="dk1"/>
-                    </a:solidFill>
-                  </a:rPr>
-                  <a:t>POS</a:t>
-                </a:r>
-                <a:endParaRPr dirty="0"/>
-              </a:p>
-            </p:txBody>
-          </p:sp>
-        </p:grpSp>
-        <p:grpSp>
-          <p:nvGrpSpPr>
-            <p:cNvPr id="10" name="Group 9">
-              <a:extLst>
-                <a:ext uri="{FF2B5EF4-FFF2-40B4-BE49-F238E27FC236}">
-                  <a16:creationId xmlns:a16="http://schemas.microsoft.com/office/drawing/2014/main" id="{292CB646-23EB-B8BA-C96E-7709F7927812}"/>
-                </a:ext>
-              </a:extLst>
-            </p:cNvPr>
-            <p:cNvGrpSpPr/>
-            <p:nvPr/>
-          </p:nvGrpSpPr>
-          <p:grpSpPr>
-            <a:xfrm>
-              <a:off x="5029055" y="1550100"/>
-              <a:ext cx="2098200" cy="2354787"/>
-              <a:chOff x="3522900" y="1550100"/>
-              <a:chExt cx="2098200" cy="2354787"/>
-            </a:xfrm>
-          </p:grpSpPr>
-          <p:sp>
-            <p:nvSpPr>
-              <p:cNvPr id="5" name="Google Shape;114;p18">
-                <a:extLst>
-                  <a:ext uri="{FF2B5EF4-FFF2-40B4-BE49-F238E27FC236}">
-                    <a16:creationId xmlns:a16="http://schemas.microsoft.com/office/drawing/2014/main" id="{77FC509D-BB27-9EC3-3706-8EF14D1E2B9E}"/>
-                  </a:ext>
-                </a:extLst>
-              </p:cNvPr>
-              <p:cNvSpPr txBox="1"/>
-              <p:nvPr/>
-            </p:nvSpPr>
-            <p:spPr>
-              <a:xfrm>
-                <a:off x="3522900" y="2843088"/>
-                <a:ext cx="2098200" cy="1061799"/>
-              </a:xfrm>
-              <a:prstGeom prst="rect">
-                <a:avLst/>
-              </a:prstGeom>
-              <a:noFill/>
-              <a:ln>
-                <a:noFill/>
-              </a:ln>
-            </p:spPr>
-            <p:txBody>
-              <a:bodyPr spcFirstLastPara="1" wrap="square" lIns="91425" tIns="91425" rIns="91425" bIns="91425" anchor="t" anchorCtr="0">
-                <a:spAutoFit/>
-              </a:bodyPr>
-              <a:lstStyle/>
-              <a:p>
-                <a:pPr marL="0" lvl="0" indent="0" algn="ctr" rtl="0">
-                  <a:spcBef>
-                    <a:spcPts val="0"/>
-                  </a:spcBef>
-                  <a:spcAft>
-                    <a:spcPts val="0"/>
-                  </a:spcAft>
-                  <a:buNone/>
-                </a:pPr>
-                <a:r>
-                  <a:rPr lang="en-US" altLang="zh-CN" sz="1800" b="1" dirty="0">
-                    <a:solidFill>
-                      <a:schemeClr val="dk1"/>
-                    </a:solidFill>
-                  </a:rPr>
-                  <a:t>Pre-Processing</a:t>
-                </a:r>
-              </a:p>
-              <a:p>
-                <a:pPr marL="0" lvl="0" indent="0" rtl="0">
-                  <a:spcBef>
-                    <a:spcPts val="0"/>
-                  </a:spcBef>
-                  <a:spcAft>
-                    <a:spcPts val="0"/>
-                  </a:spcAft>
-                  <a:buNone/>
-                </a:pPr>
-                <a:r>
-                  <a:rPr lang="en-US" altLang="zh-CN" sz="1300" dirty="0">
-                    <a:solidFill>
-                      <a:schemeClr val="dk1"/>
-                    </a:solidFill>
-                  </a:rPr>
-                  <a:t>Pre-process</a:t>
-                </a:r>
-                <a:r>
-                  <a:rPr lang="zh-CN" altLang="en-US" sz="1300" dirty="0">
-                    <a:solidFill>
-                      <a:schemeClr val="dk1"/>
-                    </a:solidFill>
-                  </a:rPr>
-                  <a:t> </a:t>
-                </a:r>
-                <a:r>
-                  <a:rPr lang="en-US" altLang="zh-CN" sz="1300" dirty="0">
-                    <a:solidFill>
-                      <a:schemeClr val="dk1"/>
-                    </a:solidFill>
-                  </a:rPr>
-                  <a:t>training</a:t>
-                </a:r>
-                <a:r>
-                  <a:rPr lang="zh-CN" altLang="en-US" sz="1300" dirty="0">
-                    <a:solidFill>
-                      <a:schemeClr val="dk1"/>
-                    </a:solidFill>
-                  </a:rPr>
-                  <a:t> </a:t>
-                </a:r>
-                <a:r>
-                  <a:rPr lang="en-US" altLang="zh-CN" sz="1300" dirty="0">
-                    <a:solidFill>
-                      <a:schemeClr val="dk1"/>
-                    </a:solidFill>
-                  </a:rPr>
-                  <a:t>data</a:t>
-                </a:r>
-                <a:r>
-                  <a:rPr lang="zh-CN" altLang="en-US" sz="1300" dirty="0">
-                    <a:solidFill>
-                      <a:schemeClr val="dk1"/>
-                    </a:solidFill>
-                  </a:rPr>
-                  <a:t> </a:t>
-                </a:r>
-                <a:r>
-                  <a:rPr lang="en-US" altLang="zh-CN" sz="1300" dirty="0">
-                    <a:solidFill>
-                      <a:schemeClr val="dk1"/>
-                    </a:solidFill>
-                  </a:rPr>
-                  <a:t>to</a:t>
-                </a:r>
-                <a:r>
-                  <a:rPr lang="zh-CN" altLang="en-US" sz="1300" dirty="0">
-                    <a:solidFill>
-                      <a:schemeClr val="dk1"/>
-                    </a:solidFill>
-                  </a:rPr>
-                  <a:t> </a:t>
-                </a:r>
-                <a:r>
-                  <a:rPr lang="en-US" altLang="zh-CN" sz="1300" dirty="0">
-                    <a:solidFill>
-                      <a:schemeClr val="dk1"/>
-                    </a:solidFill>
-                  </a:rPr>
-                  <a:t>eliminate</a:t>
-                </a:r>
-                <a:r>
-                  <a:rPr lang="zh-CN" altLang="en-US" sz="1300" dirty="0">
-                    <a:solidFill>
-                      <a:schemeClr val="dk1"/>
-                    </a:solidFill>
-                  </a:rPr>
-                  <a:t> </a:t>
-                </a:r>
-                <a:r>
-                  <a:rPr lang="en-US" altLang="zh-CN" sz="1300" dirty="0">
-                    <a:solidFill>
-                      <a:schemeClr val="dk1"/>
-                    </a:solidFill>
-                  </a:rPr>
-                  <a:t>noise,</a:t>
-                </a:r>
-                <a:r>
-                  <a:rPr lang="zh-CN" altLang="en-US" sz="1300" dirty="0">
-                    <a:solidFill>
-                      <a:schemeClr val="dk1"/>
-                    </a:solidFill>
-                  </a:rPr>
-                  <a:t> </a:t>
-                </a:r>
-                <a:r>
-                  <a:rPr lang="en-US" altLang="zh-CN" sz="1300" dirty="0">
-                    <a:solidFill>
-                      <a:schemeClr val="dk1"/>
-                    </a:solidFill>
-                  </a:rPr>
-                  <a:t>using</a:t>
-                </a:r>
-                <a:r>
-                  <a:rPr lang="zh-CN" altLang="en-US" sz="1300" dirty="0">
-                    <a:solidFill>
-                      <a:schemeClr val="dk1"/>
-                    </a:solidFill>
-                  </a:rPr>
-                  <a:t> </a:t>
-                </a:r>
-                <a:r>
-                  <a:rPr lang="en-US" altLang="zh-CN" sz="1300" dirty="0">
-                    <a:solidFill>
-                      <a:schemeClr val="dk1"/>
-                    </a:solidFill>
-                  </a:rPr>
-                  <a:t>Support</a:t>
-                </a:r>
-                <a:r>
-                  <a:rPr lang="zh-CN" altLang="en-US" sz="1300" dirty="0">
-                    <a:solidFill>
-                      <a:schemeClr val="dk1"/>
-                    </a:solidFill>
-                  </a:rPr>
-                  <a:t> </a:t>
-                </a:r>
-                <a:r>
-                  <a:rPr lang="en-US" altLang="zh-CN" sz="1300" dirty="0">
-                    <a:solidFill>
-                      <a:schemeClr val="dk1"/>
-                    </a:solidFill>
-                  </a:rPr>
-                  <a:t>Vector</a:t>
-                </a:r>
-                <a:r>
-                  <a:rPr lang="zh-CN" altLang="en-US" sz="1300" dirty="0">
-                    <a:solidFill>
-                      <a:schemeClr val="dk1"/>
-                    </a:solidFill>
-                  </a:rPr>
-                  <a:t> </a:t>
-                </a:r>
-                <a:r>
-                  <a:rPr lang="en-US" altLang="zh-CN" sz="1300" dirty="0">
-                    <a:solidFill>
-                      <a:schemeClr val="dk1"/>
-                    </a:solidFill>
-                  </a:rPr>
-                  <a:t>Machine.</a:t>
-                </a:r>
-                <a:endParaRPr sz="1300" dirty="0">
-                  <a:solidFill>
-                    <a:schemeClr val="dk1"/>
-                  </a:solidFill>
-                </a:endParaRPr>
-              </a:p>
-            </p:txBody>
-          </p:sp>
-          <p:grpSp>
-            <p:nvGrpSpPr>
-              <p:cNvPr id="9" name="Group 8">
-                <a:extLst>
-                  <a:ext uri="{FF2B5EF4-FFF2-40B4-BE49-F238E27FC236}">
-                    <a16:creationId xmlns:a16="http://schemas.microsoft.com/office/drawing/2014/main" id="{61449050-D9A1-4A56-3438-6B1B83E754DF}"/>
-                  </a:ext>
-                </a:extLst>
-              </p:cNvPr>
-              <p:cNvGrpSpPr/>
-              <p:nvPr/>
-            </p:nvGrpSpPr>
-            <p:grpSpPr>
-              <a:xfrm>
-                <a:off x="3522900" y="1550100"/>
-                <a:ext cx="2098200" cy="1234200"/>
-                <a:chOff x="3522900" y="1550100"/>
-                <a:chExt cx="2098200" cy="1234200"/>
-              </a:xfrm>
-            </p:grpSpPr>
-            <p:sp>
-              <p:nvSpPr>
-                <p:cNvPr id="7" name="Google Shape;117;p18">
-                  <a:extLst>
-                    <a:ext uri="{FF2B5EF4-FFF2-40B4-BE49-F238E27FC236}">
-                      <a16:creationId xmlns:a16="http://schemas.microsoft.com/office/drawing/2014/main" id="{0A78C199-F51D-0748-1B4E-283B878A5D1E}"/>
-                    </a:ext>
-                  </a:extLst>
-                </p:cNvPr>
-                <p:cNvSpPr/>
-                <p:nvPr/>
-              </p:nvSpPr>
-              <p:spPr>
-                <a:xfrm>
-                  <a:off x="3522900" y="1550100"/>
-                  <a:ext cx="2098200" cy="1234200"/>
-                </a:xfrm>
-                <a:prstGeom prst="wedgeEllipseCallout">
-                  <a:avLst>
-                    <a:gd name="adj1" fmla="val -38494"/>
-                    <a:gd name="adj2" fmla="val 53352"/>
-                  </a:avLst>
-                </a:prstGeom>
-                <a:solidFill>
-                  <a:srgbClr val="434343"/>
-                </a:solidFill>
-                <a:ln>
-                  <a:noFill/>
-                </a:ln>
-              </p:spPr>
-              <p:txBody>
-                <a:bodyPr spcFirstLastPara="1" wrap="square" lIns="91425" tIns="91425" rIns="91425" bIns="91425" anchor="ctr" anchorCtr="0">
-                  <a:noAutofit/>
-                </a:bodyPr>
-                <a:lstStyle/>
-                <a:p>
-                  <a:pPr marL="0" lvl="0" indent="0" algn="ctr" rtl="0">
-                    <a:spcBef>
-                      <a:spcPts val="0"/>
-                    </a:spcBef>
-                    <a:spcAft>
-                      <a:spcPts val="0"/>
-                    </a:spcAft>
-                    <a:buNone/>
-                  </a:pPr>
-                  <a:endParaRPr/>
-                </a:p>
-              </p:txBody>
-            </p:sp>
-            <p:pic>
-              <p:nvPicPr>
-                <p:cNvPr id="6" name="Picture 5">
-                  <a:extLst>
-                    <a:ext uri="{FF2B5EF4-FFF2-40B4-BE49-F238E27FC236}">
-                      <a16:creationId xmlns:a16="http://schemas.microsoft.com/office/drawing/2014/main" id="{6D9B725B-0406-A68E-E25D-0315F4DB2B8A}"/>
-                    </a:ext>
-                  </a:extLst>
-                </p:cNvPr>
-                <p:cNvPicPr>
-                  <a:picLocks noChangeAspect="1"/>
-                </p:cNvPicPr>
-                <p:nvPr/>
-              </p:nvPicPr>
-              <p:blipFill>
-                <a:blip r:embed="rId2"/>
-                <a:stretch>
-                  <a:fillRect/>
-                </a:stretch>
-              </p:blipFill>
-              <p:spPr>
-                <a:xfrm>
-                  <a:off x="4087495" y="1700639"/>
-                  <a:ext cx="969010" cy="933121"/>
-                </a:xfrm>
-                <a:prstGeom prst="rect">
-                  <a:avLst/>
-                </a:prstGeom>
-              </p:spPr>
-            </p:pic>
-          </p:grpSp>
-        </p:grpSp>
-      </p:grpSp>
-    </p:spTree>
-    <p:extLst>
-      <p:ext uri="{BB962C8B-B14F-4D97-AF65-F5344CB8AC3E}">
-        <p14:creationId xmlns:p14="http://schemas.microsoft.com/office/powerpoint/2010/main" val="290130123"/>
-      </p:ext>
-    </p:extLst>
-  </p:cSld>
-  <p:clrMapOvr>
-    <a:masterClrMapping/>
-  </p:clrMapOvr>
-</p:sld>
-</file>
-
-<file path=ppt/slides/slide23.xml><?xml version="1.0" encoding="utf-8"?>
-<p:sld xmlns:a="http://schemas.openxmlformats.org/drawingml/2006/main" xmlns:r="http://schemas.openxmlformats.org/officeDocument/2006/relationships" xmlns:p="http://schemas.openxmlformats.org/presentationml/2006/main">
-  <p:cSld>
-    <p:spTree>
-      <p:nvGrpSpPr>
         <p:cNvPr id="1" name="Shape 235"/>
         <p:cNvGrpSpPr/>
         <p:nvPr/>
@@ -19369,7 +18589,7 @@
 </p:sld>
 </file>
 
-<file path=ppt/slides/slide24.xml><?xml version="1.0" encoding="utf-8"?>
+<file path=ppt/slides/slide23.xml><?xml version="1.0" encoding="utf-8"?>
 <p:sld xmlns:a="http://schemas.openxmlformats.org/drawingml/2006/main" xmlns:r="http://schemas.openxmlformats.org/officeDocument/2006/relationships" xmlns:p="http://schemas.openxmlformats.org/presentationml/2006/main">
   <p:cSld>
     <p:spTree>
@@ -19755,7 +18975,7 @@
         <p14:prism/>
       </p:transition>
     </mc:Choice>
-    <mc:Fallback xmlns:ahyp="http://schemas.microsoft.com/office/drawing/2018/hyperlinkcolor" xmlns:p15="http://schemas.microsoft.com/office/powerpoint/2012/main" xmlns:com="http://schemas.openxmlformats.org/drawingml/2006/compatibility" xmlns:pvml="urn:schemas-microsoft-com:office:powerpoint" xmlns:v="urn:schemas-microsoft-com:vml" xmlns:o="urn:schemas-microsoft-com:office:office" xmlns:dgm="http://schemas.openxmlformats.org/drawingml/2006/diagram" xmlns:c="http://schemas.openxmlformats.org/drawingml/2006/chart" xmlns:mv="urn:schemas-microsoft-com:mac:vml" xmlns="">
+    <mc:Fallback xmlns="" xmlns:mv="urn:schemas-microsoft-com:mac:vml" xmlns:c="http://schemas.openxmlformats.org/drawingml/2006/chart" xmlns:dgm="http://schemas.openxmlformats.org/drawingml/2006/diagram" xmlns:o="urn:schemas-microsoft-com:office:office" xmlns:v="urn:schemas-microsoft-com:vml" xmlns:pvml="urn:schemas-microsoft-com:office:powerpoint" xmlns:com="http://schemas.openxmlformats.org/drawingml/2006/compatibility" xmlns:p15="http://schemas.microsoft.com/office/powerpoint/2012/main" xmlns:ahyp="http://schemas.microsoft.com/office/drawing/2018/hyperlinkcolor">
       <p:transition spd="med">
         <p:fade/>
       </p:transition>
@@ -19885,7 +19105,7 @@
         <p14:prism/>
       </p:transition>
     </mc:Choice>
-    <mc:Fallback xmlns:ahyp="http://schemas.microsoft.com/office/drawing/2018/hyperlinkcolor" xmlns:p15="http://schemas.microsoft.com/office/powerpoint/2012/main" xmlns:com="http://schemas.openxmlformats.org/drawingml/2006/compatibility" xmlns:pvml="urn:schemas-microsoft-com:office:powerpoint" xmlns:v="urn:schemas-microsoft-com:vml" xmlns:o="urn:schemas-microsoft-com:office:office" xmlns:dgm="http://schemas.openxmlformats.org/drawingml/2006/diagram" xmlns:c="http://schemas.openxmlformats.org/drawingml/2006/chart" xmlns:mv="urn:schemas-microsoft-com:mac:vml" xmlns="">
+    <mc:Fallback xmlns="" xmlns:mv="urn:schemas-microsoft-com:mac:vml" xmlns:c="http://schemas.openxmlformats.org/drawingml/2006/chart" xmlns:dgm="http://schemas.openxmlformats.org/drawingml/2006/diagram" xmlns:o="urn:schemas-microsoft-com:office:office" xmlns:v="urn:schemas-microsoft-com:vml" xmlns:pvml="urn:schemas-microsoft-com:office:powerpoint" xmlns:com="http://schemas.openxmlformats.org/drawingml/2006/compatibility" xmlns:p15="http://schemas.microsoft.com/office/powerpoint/2012/main" xmlns:ahyp="http://schemas.microsoft.com/office/drawing/2018/hyperlinkcolor">
       <p:transition spd="med">
         <p:fade/>
       </p:transition>

</xml_diff>